<commit_message>
Update: Session clear logic and precise source attribution prompts
</commit_message>
<xml_diff>
--- a/generated_presentation.pptx
+++ b/generated_presentation.pptx
@@ -8,7 +8,6 @@
     <p:sldId id="256" r:id="rId7"/>
     <p:sldId id="257" r:id="rId8"/>
     <p:sldId id="258" r:id="rId10"/>
-    <p:sldId id="259" r:id="rId11"/>
   </p:sldIdLst>
   <p:sldSz cx="9144000" cy="6858000" type="screen4x3"/>
   <p:notesSz cx="6858000" cy="9144000"/>
@@ -505,7 +504,7 @@
           <a:lstStyle/>
           <a:p>
             <a:r>
-              <a:t>こども家庭庁が試算を公表。会社員、公務員などが加入する被用者保険での負担額が具体化しました。</a:t>
+              <a:t>出典：公明新聞（2025年12月22日、25日付）。年末の紙面は組織の引き締めと成果の可視化に重点。</a:t>
             </a:r>
           </a:p>
         </p:txBody>
@@ -575,77 +574,7 @@
           <a:lstStyle/>
           <a:p>
             <a:r>
-              <a:t>「説明不十分」との報道が多数。医療保険という既存の仕組みを使うことで、事実上の増税感が強まっています。</a:t>
-            </a:r>
-          </a:p>
-        </p:txBody>
-      </p:sp>
-      <p:sp>
-        <p:nvSpPr>
-          <p:cNvPr id="4" name="Slide Number Placeholder 3"/>
-          <p:cNvSpPr>
-            <a:spLocks noGrp="1"/>
-          </p:cNvSpPr>
-          <p:nvPr>
-            <p:ph type="sldNum" idx="5" sz="quarter"/>
-          </p:nvPr>
-        </p:nvSpPr>
-        <p:spPr/>
-      </p:sp>
-    </p:spTree>
-  </p:cSld>
-  <p:clrMapOvr>
-    <a:masterClrMapping/>
-  </p:clrMapOvr>
-</p:notes>
-</file>
-
-<file path=ppt/notesSlides/notesSlide3.xml><?xml version="1.0" encoding="utf-8"?>
-<p:notes xmlns:a="http://schemas.openxmlformats.org/drawingml/2006/main" xmlns:p="http://schemas.openxmlformats.org/presentationml/2006/main" xmlns:r="http://schemas.openxmlformats.org/officeDocument/2006/relationships">
-  <p:cSld>
-    <p:spTree>
-      <p:nvGrpSpPr>
-        <p:cNvPr id="1" name=""/>
-        <p:cNvGrpSpPr/>
-        <p:nvPr/>
-      </p:nvGrpSpPr>
-      <p:grpSpPr>
-        <a:xfrm>
-          <a:off x="0" y="0"/>
-          <a:ext cx="0" cy="0"/>
-          <a:chOff x="0" y="0"/>
-          <a:chExt cx="0" cy="0"/>
-        </a:xfrm>
-      </p:grpSpPr>
-      <p:sp>
-        <p:nvSpPr>
-          <p:cNvPr id="2" name="Slide Image Placeholder 1"/>
-          <p:cNvSpPr>
-            <a:spLocks noGrp="1"/>
-          </p:cNvSpPr>
-          <p:nvPr>
-            <p:ph type="sldImg" idx="2"/>
-          </p:nvPr>
-        </p:nvSpPr>
-        <p:spPr/>
-      </p:sp>
-      <p:sp>
-        <p:nvSpPr>
-          <p:cNvPr id="3" name="Notes Placeholder 2"/>
-          <p:cNvSpPr>
-            <a:spLocks noGrp="1"/>
-          </p:cNvSpPr>
-          <p:nvPr>
-            <p:ph type="body" idx="3" sz="quarter"/>
-          </p:nvPr>
-        </p:nvSpPr>
-        <p:spPr/>
-        <p:txBody>
-          <a:bodyPr/>
-          <a:lstStyle/>
-          <a:p>
-            <a:r>
-              <a:t>単なる徴収だけでなく、高校生扶養控除や所得制限撤廃など、パッケージとしての政策評価が問われます。</a:t>
+              <a:t>出典：衆議院 議事録（2025年3月14日、28日）。機関紙は党のアイデンティティ形成の核心。</a:t>
             </a:r>
           </a:p>
         </p:txBody>
@@ -3667,7 +3596,7 @@
           <a:lstStyle/>
           <a:p>
             <a:r>
-              <a:t>子育て支援に関する解説</a:t>
+              <a:t>公明新聞の今週１週間の気になる話題をまとめてに関する解説</a:t>
             </a:r>
           </a:p>
         </p:txBody>
@@ -3727,7 +3656,7 @@
           <a:lstStyle/>
           <a:p>
             <a:r>
-              <a:t>2026年4月開始「子育て支援金」の全貌</a:t>
+              <a:t>今週の公明新聞：地域組織の「基礎体力」測定</a:t>
             </a:r>
           </a:p>
         </p:txBody>
@@ -3748,17 +3677,17 @@
           <a:lstStyle/>
           <a:p>
             <a:r>
-              <a:t>・徴収方法：医療保険料に上乗せして徴収</a:t>
-            </a:r>
-          </a:p>
-          <a:p>
-            <a:r>
-              <a:t>・負担額試算：年収600万円で月575円、800万円で月767円程度</a:t>
-            </a:r>
-          </a:p>
-          <a:p>
-            <a:r>
-              <a:t>・規模：2026年度の総額は約6000億円の見通し</a:t>
+              <a:t>・大阪・高石支部：「有権者比1%」を達成（46,827人中484部購読）</a:t>
+            </a:r>
+          </a:p>
+          <a:p>
+            <a:r>
+              <a:t>・仙台・宮城野支部：支部会に96人参加、替え歌などで結束強化</a:t>
+            </a:r>
+          </a:p>
+          <a:p>
+            <a:r>
+              <a:t>・宇都宮：企業経営者による購読事例を紹介（支持層拡大のアピール）</a:t>
             </a:r>
           </a:p>
         </p:txBody>
@@ -3797,7 +3726,7 @@
           <a:lstStyle/>
           <a:p>
             <a:r>
-              <a:t>批判殺到？「独身税」と呼ばれる理由</a:t>
+              <a:t>国会論戦に見る「公明新聞」の2つの顔</a:t>
             </a:r>
           </a:p>
         </p:txBody>
@@ -3818,87 +3747,17 @@
           <a:lstStyle/>
           <a:p>
             <a:r>
-              <a:t>・批判の核心：子育て世帯以外も負担するため「不公平」との声</a:t>
-            </a:r>
-          </a:p>
-          <a:p>
-            <a:r>
-              <a:t>・政府のロジック：「全世代型社会保障」として社会全体で支える</a:t>
-            </a:r>
-          </a:p>
-          <a:p>
-            <a:r>
-              <a:t>・懸念点：「実質負担増なし」の説明と、実際の給与天引きの乖離</a:t>
-            </a:r>
-          </a:p>
-        </p:txBody>
-      </p:sp>
-    </p:spTree>
-  </p:cSld>
-  <p:clrMapOvr>
-    <a:masterClrMapping/>
-  </p:clrMapOvr>
-</p:sld>
-</file>
-
-<file path=ppt/slides/slide4.xml><?xml version="1.0" encoding="utf-8"?>
-<p:sld xmlns:a="http://schemas.openxmlformats.org/drawingml/2006/main" xmlns:p="http://schemas.openxmlformats.org/presentationml/2006/main" xmlns:r="http://schemas.openxmlformats.org/officeDocument/2006/relationships">
-  <p:cSld>
-    <p:spTree>
-      <p:nvGrpSpPr>
-        <p:cNvPr id="1" name=""/>
-        <p:cNvGrpSpPr/>
-        <p:nvPr/>
-      </p:nvGrpSpPr>
-      <p:grpSpPr/>
-      <p:sp>
-        <p:nvSpPr>
-          <p:cNvPr id="2" name="Title 1"/>
-          <p:cNvSpPr>
-            <a:spLocks noGrp="1"/>
-          </p:cNvSpPr>
-          <p:nvPr>
-            <p:ph type="title"/>
-          </p:nvPr>
-        </p:nvSpPr>
-        <p:spPr/>
-        <p:txBody>
-          <a:bodyPr/>
-          <a:lstStyle/>
-          <a:p>
-            <a:r>
-              <a:t>今後の焦点：政治はどう動くか</a:t>
-            </a:r>
-          </a:p>
-        </p:txBody>
-      </p:sp>
-      <p:sp>
-        <p:nvSpPr>
-          <p:cNvPr id="3" name="Content Placeholder 2"/>
-          <p:cNvSpPr>
-            <a:spLocks noGrp="1"/>
-          </p:cNvSpPr>
-          <p:nvPr>
-            <p:ph idx="1"/>
-          </p:nvPr>
-        </p:nvSpPr>
-        <p:spPr/>
-        <p:txBody>
-          <a:bodyPr/>
-          <a:lstStyle/>
-          <a:p>
-            <a:r>
-              <a:t>・与党の対応：公明党などが「扶養控除維持」で負担感を緩和へ</a:t>
-            </a:r>
-          </a:p>
-          <a:p>
-            <a:r>
-              <a:t>・高市政権の課題：賃上げが負担増を上回れるか（経済再生との両立）</a:t>
-            </a:r>
-          </a:p>
-          <a:p>
-            <a:r>
-              <a:t>・選挙への影響：来春の実施開始後の世論反応が政局を左右する</a:t>
+              <a:t>・財政面：「事実上赤字で利益になっていない」との指摘も（3/14 福島委員）</a:t>
+            </a:r>
+          </a:p>
+          <a:p>
+            <a:r>
+              <a:t>・記録面：1993年の記事を引用し、政治改革の「一貫性」を証明（3/28 中川委員）</a:t>
+            </a:r>
+          </a:p>
+          <a:p>
+            <a:r>
+              <a:t>・結論：単なる広報紙ではなく、組織維持装置兼アーカイブとしての機能</a:t>
             </a:r>
           </a:p>
         </p:txBody>

</xml_diff>